<commit_message>
bug fixes in response matrices
</commit_message>
<xml_diff>
--- a/Weekly Meetings/HEP_Weekly_20March2020.pptx
+++ b/Weekly Meetings/HEP_Weekly_20March2020.pptx
@@ -6,15 +6,16 @@
     <p:sldMasterId id="2147483661" r:id="rId2"/>
   </p:sldMasterIdLst>
   <p:notesMasterIdLst>
-    <p:notesMasterId r:id="rId6"/>
+    <p:notesMasterId r:id="rId7"/>
   </p:notesMasterIdLst>
   <p:handoutMasterIdLst>
-    <p:handoutMasterId r:id="rId7"/>
+    <p:handoutMasterId r:id="rId8"/>
   </p:handoutMasterIdLst>
   <p:sldIdLst>
     <p:sldId id="256" r:id="rId3"/>
     <p:sldId id="500" r:id="rId4"/>
     <p:sldId id="503" r:id="rId5"/>
+    <p:sldId id="505" r:id="rId6"/>
   </p:sldIdLst>
   <p:sldSz cx="12192000" cy="6858000"/>
   <p:notesSz cx="6858000" cy="9144000"/>
@@ -206,7 +207,7 @@
           <a:p>
             <a:fld id="{8CD5EADE-870B-3C4D-92F6-FE927CFCE2A1}" type="datetime1">
               <a:rPr lang="en-US" smtClean="0"/>
-              <a:t>3/20/20</a:t>
+              <a:t>3/27/20</a:t>
             </a:fld>
             <a:endParaRPr lang="en-GB"/>
           </a:p>
@@ -412,7 +413,7 @@
           <a:p>
             <a:fld id="{4A3A8317-869C-EC49-8CB2-3286EE886873}" type="datetime1">
               <a:rPr lang="en-US" smtClean="0"/>
-              <a:t>3/20/20</a:t>
+              <a:t>3/27/20</a:t>
             </a:fld>
             <a:endParaRPr lang="en-GB"/>
           </a:p>
@@ -746,7 +747,7 @@
           <a:p>
             <a:fld id="{B49D5E6A-E658-F947-B519-3BD764463DDB}" type="datetime1">
               <a:rPr lang="en-US" smtClean="0"/>
-              <a:t>3/20/20</a:t>
+              <a:t>3/27/20</a:t>
             </a:fld>
             <a:endParaRPr lang="en-GB"/>
           </a:p>
@@ -1014,7 +1015,7 @@
           <a:p>
             <a:fld id="{3FD6B7D5-59BD-A94A-8259-AFB77C1C6F6C}" type="datetime1">
               <a:rPr lang="en-US" smtClean="0"/>
-              <a:t>3/20/20</a:t>
+              <a:t>3/27/20</a:t>
             </a:fld>
             <a:endParaRPr lang="en-US" dirty="0"/>
           </a:p>
@@ -1221,7 +1222,7 @@
           <a:p>
             <a:fld id="{22747042-83B4-2D44-B16D-692521656AEA}" type="datetime1">
               <a:rPr lang="en-US" smtClean="0"/>
-              <a:t>3/20/20</a:t>
+              <a:t>3/27/20</a:t>
             </a:fld>
             <a:endParaRPr lang="en-US" dirty="0"/>
           </a:p>
@@ -1476,7 +1477,7 @@
           <a:p>
             <a:fld id="{123C6174-D222-ED47-AF35-85B52783FDE1}" type="datetime1">
               <a:rPr lang="en-US" smtClean="0"/>
-              <a:t>3/20/20</a:t>
+              <a:t>3/27/20</a:t>
             </a:fld>
             <a:endParaRPr lang="en-US" dirty="0"/>
           </a:p>
@@ -1667,7 +1668,7 @@
           <a:p>
             <a:fld id="{92BB3830-AA68-4343-953F-F849943EB849}" type="datetime1">
               <a:rPr lang="en-US" smtClean="0"/>
-              <a:t>3/20/20</a:t>
+              <a:t>3/27/20</a:t>
             </a:fld>
             <a:endParaRPr lang="en-GB"/>
           </a:p>
@@ -1841,7 +1842,7 @@
           <a:p>
             <a:fld id="{13F0FE4D-A637-F644-BCB7-BB01E9473082}" type="datetime1">
               <a:rPr lang="en-US" smtClean="0"/>
-              <a:t>3/20/20</a:t>
+              <a:t>3/27/20</a:t>
             </a:fld>
             <a:endParaRPr lang="en-GB"/>
           </a:p>
@@ -2091,7 +2092,7 @@
           <a:p>
             <a:fld id="{7916914C-F633-3B4D-8E7C-AF9878FBCAB2}" type="datetime1">
               <a:rPr lang="en-US" smtClean="0"/>
-              <a:t>3/20/20</a:t>
+              <a:t>3/27/20</a:t>
             </a:fld>
             <a:endParaRPr lang="en-GB"/>
           </a:p>
@@ -2327,7 +2328,7 @@
           <a:p>
             <a:fld id="{1BEE493E-6ECC-2D49-AA37-47715FC69928}" type="datetime1">
               <a:rPr lang="en-US" smtClean="0"/>
-              <a:t>3/20/20</a:t>
+              <a:t>3/27/20</a:t>
             </a:fld>
             <a:endParaRPr lang="en-GB"/>
           </a:p>
@@ -2698,7 +2699,7 @@
           <a:p>
             <a:fld id="{44D2375D-BCDA-CD42-A7D1-F6C0DA2CE615}" type="datetime1">
               <a:rPr lang="en-US" smtClean="0"/>
-              <a:t>3/20/20</a:t>
+              <a:t>3/27/20</a:t>
             </a:fld>
             <a:endParaRPr lang="en-GB"/>
           </a:p>
@@ -2820,7 +2821,7 @@
           <a:p>
             <a:fld id="{DF706FF0-E883-3242-B340-EF59CDD02701}" type="datetime1">
               <a:rPr lang="en-US" smtClean="0"/>
-              <a:t>3/20/20</a:t>
+              <a:t>3/27/20</a:t>
             </a:fld>
             <a:endParaRPr lang="en-GB"/>
           </a:p>
@@ -2919,7 +2920,7 @@
           <a:p>
             <a:fld id="{A72B1547-4678-7444-8B0B-D61236993AA6}" type="datetime1">
               <a:rPr lang="en-US" smtClean="0"/>
-              <a:t>3/20/20</a:t>
+              <a:t>3/27/20</a:t>
             </a:fld>
             <a:endParaRPr lang="en-GB"/>
           </a:p>
@@ -3200,7 +3201,7 @@
           <a:p>
             <a:fld id="{F5C0FF04-D16D-9545-B9FE-2A2509161914}" type="datetime1">
               <a:rPr lang="en-US" smtClean="0"/>
-              <a:t>3/20/20</a:t>
+              <a:t>3/27/20</a:t>
             </a:fld>
             <a:endParaRPr lang="en-GB"/>
           </a:p>
@@ -3356,7 +3357,7 @@
           <a:p>
             <a:fld id="{739BCA09-01A4-7D40-97AF-A677405590ED}" type="datetime1">
               <a:rPr lang="en-US" smtClean="0"/>
-              <a:t>3/20/20</a:t>
+              <a:t>3/27/20</a:t>
             </a:fld>
             <a:endParaRPr lang="en-US" dirty="0"/>
           </a:p>
@@ -3637,7 +3638,7 @@
           <a:p>
             <a:fld id="{95430EDC-66BF-5B4F-9F6B-EF430B2635C2}" type="datetime1">
               <a:rPr lang="en-US" smtClean="0"/>
-              <a:t>3/20/20</a:t>
+              <a:t>3/27/20</a:t>
             </a:fld>
             <a:endParaRPr lang="en-GB"/>
           </a:p>
@@ -3811,7 +3812,7 @@
           <a:p>
             <a:fld id="{C40C6D0C-61E5-A14E-AA64-932059ABBCA0}" type="datetime1">
               <a:rPr lang="en-US" smtClean="0"/>
-              <a:t>3/20/20</a:t>
+              <a:t>3/27/20</a:t>
             </a:fld>
             <a:endParaRPr lang="en-GB"/>
           </a:p>
@@ -3995,7 +3996,7 @@
           <a:p>
             <a:fld id="{686993B2-94FA-8143-ACBD-1339E5A7C63D}" type="datetime1">
               <a:rPr lang="en-US" smtClean="0"/>
-              <a:t>3/20/20</a:t>
+              <a:t>3/27/20</a:t>
             </a:fld>
             <a:endParaRPr lang="en-GB"/>
           </a:p>
@@ -4342,7 +4343,7 @@
           <a:p>
             <a:fld id="{887F3A82-5004-DE46-9B8F-C8D1AE47BCDD}" type="datetime1">
               <a:rPr lang="en-US" smtClean="0"/>
-              <a:t>3/20/20</a:t>
+              <a:t>3/27/20</a:t>
             </a:fld>
             <a:endParaRPr lang="en-US" dirty="0"/>
           </a:p>
@@ -4616,7 +4617,7 @@
           <a:p>
             <a:fld id="{9609816B-101F-E649-A6DB-1B34F62305FD}" type="datetime1">
               <a:rPr lang="en-US" smtClean="0"/>
-              <a:t>3/20/20</a:t>
+              <a:t>3/27/20</a:t>
             </a:fld>
             <a:endParaRPr lang="en-US" dirty="0"/>
           </a:p>
@@ -4994,7 +4995,7 @@
           <a:p>
             <a:fld id="{B4B9C9C3-E10A-4046-99D1-D14A01669CB5}" type="datetime1">
               <a:rPr lang="en-US" smtClean="0"/>
-              <a:t>3/20/20</a:t>
+              <a:t>3/27/20</a:t>
             </a:fld>
             <a:endParaRPr lang="en-US" dirty="0"/>
           </a:p>
@@ -5111,7 +5112,7 @@
           <a:p>
             <a:fld id="{B20DF165-EA06-4348-9825-CC0EB7B994A5}" type="datetime1">
               <a:rPr lang="en-US" smtClean="0"/>
-              <a:t>3/20/20</a:t>
+              <a:t>3/27/20</a:t>
             </a:fld>
             <a:endParaRPr lang="en-US" dirty="0"/>
           </a:p>
@@ -5281,7 +5282,7 @@
           <a:p>
             <a:fld id="{BC939BB5-C2A2-354E-94F1-11C8ABC84871}" type="datetime1">
               <a:rPr lang="en-US" smtClean="0"/>
-              <a:t>3/20/20</a:t>
+              <a:t>3/27/20</a:t>
             </a:fld>
             <a:endParaRPr lang="en-US" dirty="0"/>
           </a:p>
@@ -5665,7 +5666,7 @@
           <a:p>
             <a:fld id="{6BC13A68-213D-F04B-9D09-F80EB8CDDAAA}" type="datetime1">
               <a:rPr lang="en-US" smtClean="0"/>
-              <a:t>3/20/20</a:t>
+              <a:t>3/27/20</a:t>
             </a:fld>
             <a:endParaRPr lang="en-US" dirty="0"/>
           </a:p>
@@ -6047,7 +6048,7 @@
           <a:p>
             <a:fld id="{3C9CB665-2448-6244-98A5-6DB781AF1920}" type="datetime1">
               <a:rPr lang="en-US" smtClean="0"/>
-              <a:t>3/20/20</a:t>
+              <a:t>3/27/20</a:t>
             </a:fld>
             <a:endParaRPr lang="en-US" dirty="0"/>
           </a:p>
@@ -6333,7 +6334,7 @@
           <a:p>
             <a:fld id="{0675E229-76FC-AB46-B5B7-99D6369AD45B}" type="datetime1">
               <a:rPr lang="en-US" smtClean="0"/>
-              <a:t>3/20/20</a:t>
+              <a:t>3/27/20</a:t>
             </a:fld>
             <a:endParaRPr lang="en-US" dirty="0"/>
           </a:p>
@@ -7023,7 +7024,7 @@
           <a:p>
             <a:fld id="{69C84D11-6659-6A4A-919D-F211F249C3CD}" type="datetime1">
               <a:rPr lang="en-US" smtClean="0"/>
-              <a:t>3/20/20</a:t>
+              <a:t>3/27/20</a:t>
             </a:fld>
             <a:endParaRPr lang="en-GB"/>
           </a:p>
@@ -7677,7 +7678,7 @@
         <p:spPr>
           <a:xfrm>
             <a:off x="111965" y="607195"/>
-            <a:ext cx="11783048" cy="3477875"/>
+            <a:ext cx="11783048" cy="3139321"/>
           </a:xfrm>
           <a:prstGeom prst="rect">
             <a:avLst/>
@@ -7710,7 +7711,19 @@
               <a:rPr lang="en-US" sz="2200" dirty="0">
                 <a:sym typeface="Wingdings" pitchFamily="2" charset="2"/>
               </a:rPr>
-              <a:t>Mass fit</a:t>
+              <a:t>New Method for extracting </a:t>
+            </a:r>
+            <a:r>
+              <a:rPr lang="en-US" sz="2200" dirty="0" err="1">
+                <a:sym typeface="Wingdings" pitchFamily="2" charset="2"/>
+              </a:rPr>
+              <a:t>Nqcd</a:t>
+            </a:r>
+            <a:r>
+              <a:rPr lang="en-US" sz="2200" dirty="0">
+                <a:sym typeface="Wingdings" pitchFamily="2" charset="2"/>
+              </a:rPr>
+              <a:t> in signal region</a:t>
             </a:r>
           </a:p>
           <a:p>
@@ -7722,19 +7735,7 @@
               <a:rPr lang="en-US" sz="2200" dirty="0">
                 <a:sym typeface="Wingdings" pitchFamily="2" charset="2"/>
               </a:rPr>
-              <a:t>Reduce the ttbar contamination </a:t>
-            </a:r>
-          </a:p>
-          <a:p>
-            <a:pPr marL="1257300" lvl="2" indent="-342900">
-              <a:buFont typeface="Arial" panose="020B0604020202020204" pitchFamily="34" charset="0"/>
-              <a:buChar char="•"/>
-            </a:pPr>
-            <a:r>
-              <a:rPr lang="en-US" sz="2200" dirty="0">
-                <a:sym typeface="Wingdings" pitchFamily="2" charset="2"/>
-              </a:rPr>
-              <a:t>Simultaneous fit in 0 and 2btag region</a:t>
+              <a:t>Fit not possible because 0btag and 2btag QCD have very different shapes </a:t>
             </a:r>
           </a:p>
           <a:p>
@@ -7855,7 +7856,7 @@
           <a:p>
             <a:fld id="{A495A033-A54B-4F41-92C4-F7053274BB0C}" type="datetime1">
               <a:rPr lang="en-US" smtClean="0"/>
-              <a:t>3/20/20</a:t>
+              <a:t>3/27/20</a:t>
             </a:fld>
             <a:endParaRPr lang="en-US" dirty="0"/>
           </a:p>
@@ -8585,7 +8586,7 @@
                   <a:srgbClr val="00B050"/>
                 </a:solidFill>
               </a:rPr>
-              <a:t>Mass Fit</a:t>
+              <a:t>ABCD Method</a:t>
             </a:r>
           </a:p>
         </p:txBody>
@@ -8771,7 +8772,7 @@
           <a:p>
             <a:r>
               <a:rPr lang="en-US" dirty="0"/>
-              <a:t>QCD shape taken from Data (CR)</a:t>
+              <a:t>QCD shape taken from MC</a:t>
             </a:r>
           </a:p>
         </p:txBody>
@@ -8942,7 +8943,7 @@
         </p:nvSpPr>
         <p:spPr>
           <a:xfrm>
-            <a:off x="111965" y="83975"/>
+            <a:off x="114090" y="29875"/>
             <a:ext cx="11783049" cy="523220"/>
           </a:xfrm>
           <a:prstGeom prst="rect">
@@ -9018,7 +9019,7 @@
           <a:p>
             <a:fld id="{A495A033-A54B-4F41-92C4-F7053274BB0C}" type="datetime1">
               <a:rPr lang="en-US" smtClean="0"/>
-              <a:t>3/20/20</a:t>
+              <a:t>3/27/20</a:t>
             </a:fld>
             <a:endParaRPr lang="en-US" dirty="0"/>
           </a:p>
@@ -9046,7 +9047,7 @@
         </p:blipFill>
         <p:spPr>
           <a:xfrm>
-            <a:off x="111965" y="1473200"/>
+            <a:off x="0" y="607195"/>
             <a:ext cx="5316220" cy="3911600"/>
           </a:xfrm>
           <a:prstGeom prst="rect">
@@ -9068,8 +9069,8 @@
         </p:nvSpPr>
         <p:spPr>
           <a:xfrm>
-            <a:off x="5666358" y="607195"/>
-            <a:ext cx="6228656" cy="5355312"/>
+            <a:off x="5668483" y="291485"/>
+            <a:ext cx="6228656" cy="3139321"/>
           </a:xfrm>
           <a:prstGeom prst="rect">
             <a:avLst/>
@@ -9123,7 +9124,7 @@
             </a:pPr>
             <a:r>
               <a:rPr lang="en-GR" dirty="0"/>
-              <a:t>Top Tagger Cut ( &gt; selected WP)</a:t>
+              <a:t>Top Tagger Cut ( &gt; selected WP1)</a:t>
             </a:r>
           </a:p>
           <a:p>
@@ -9169,80 +9170,17 @@
               <a:buChar char="•"/>
             </a:pPr>
             <a:r>
-              <a:rPr lang="en-GR"/>
-              <a:t>Top </a:t>
-            </a:r>
-            <a:r>
-              <a:rPr lang="en-GR" dirty="0"/>
-              <a:t>Tagger Cut (selected WP)</a:t>
-            </a:r>
-          </a:p>
-          <a:p>
-            <a:pPr marL="285750" indent="-285750">
-              <a:buFont typeface="Arial" panose="020B0604020202020204" pitchFamily="34" charset="0"/>
-              <a:buChar char="•"/>
-            </a:pPr>
-            <a:endParaRPr lang="en-GR" dirty="0"/>
-          </a:p>
-          <a:p>
-            <a:pPr marL="285750" indent="-285750">
-              <a:buFont typeface="Arial" panose="020B0604020202020204" pitchFamily="34" charset="0"/>
-              <a:buChar char="•"/>
-            </a:pPr>
-            <a:r>
-              <a:rPr lang="en-GR" dirty="0"/>
-              <a:t>!! Giannis Suggested applying a harder cut in the Control region to reduce Top Contamination</a:t>
-            </a:r>
-          </a:p>
-          <a:p>
-            <a:pPr marL="285750" indent="-285750">
-              <a:buFont typeface="Arial" panose="020B0604020202020204" pitchFamily="34" charset="0"/>
-              <a:buChar char="•"/>
-            </a:pPr>
-            <a:endParaRPr lang="en-GR" dirty="0"/>
-          </a:p>
-          <a:p>
-            <a:pPr marL="285750" indent="-285750">
-              <a:buFont typeface="Arial" panose="020B0604020202020204" pitchFamily="34" charset="0"/>
-              <a:buChar char="•"/>
-            </a:pPr>
-            <a:r>
-              <a:rPr lang="en-GR" dirty="0"/>
-              <a:t>!! I suggest that we do the same thing we do with b-tagging:</a:t>
-            </a:r>
-          </a:p>
-          <a:p>
-            <a:pPr marL="285750" indent="-285750">
-              <a:buFont typeface="Arial" panose="020B0604020202020204" pitchFamily="34" charset="0"/>
-              <a:buChar char="•"/>
-            </a:pPr>
-            <a:r>
-              <a:rPr lang="en-GR" dirty="0"/>
-              <a:t>For the CR:</a:t>
-            </a:r>
-          </a:p>
-          <a:p>
-            <a:pPr marL="285750" indent="-285750">
-              <a:buFont typeface="Arial" panose="020B0604020202020204" pitchFamily="34" charset="0"/>
-              <a:buChar char="•"/>
-            </a:pPr>
-            <a:r>
               <a:rPr lang="en-GR" dirty="0">
                 <a:solidFill>
                   <a:srgbClr val="FF0000"/>
                 </a:solidFill>
               </a:rPr>
-              <a:t>NOT </a:t>
+              <a:t>NOT</a:t>
             </a:r>
             <a:r>
               <a:rPr lang="en-GR" dirty="0"/>
-              <a:t>Top Tagger Cut lower than working point that is bkg dominated. For example we could take -0.6 up to -0.3</a:t>
-            </a:r>
-            <a:endParaRPr lang="en-GR" dirty="0">
-              <a:solidFill>
-                <a:srgbClr val="FF0000"/>
-              </a:solidFill>
-            </a:endParaRPr>
+              <a:t> Top Tagger Cut ( &lt; selected WP2)</a:t>
+            </a:r>
           </a:p>
         </p:txBody>
       </p:sp>
@@ -9260,7 +9198,7 @@
         </p:nvCxnSpPr>
         <p:spPr>
           <a:xfrm flipV="1">
-            <a:off x="3386667" y="2336800"/>
+            <a:off x="3386667" y="1478842"/>
             <a:ext cx="0" cy="2562578"/>
           </a:xfrm>
           <a:prstGeom prst="line">
@@ -9301,7 +9239,7 @@
         </p:nvCxnSpPr>
         <p:spPr>
           <a:xfrm flipV="1">
-            <a:off x="2051230" y="2336800"/>
+            <a:off x="2051230" y="1478842"/>
             <a:ext cx="0" cy="2562578"/>
           </a:xfrm>
           <a:prstGeom prst="line">
@@ -9344,7 +9282,7 @@
         </p:nvCxnSpPr>
         <p:spPr>
           <a:xfrm>
-            <a:off x="3386667" y="2727702"/>
+            <a:off x="3386667" y="1869744"/>
             <a:ext cx="611896" cy="0"/>
           </a:xfrm>
           <a:prstGeom prst="straightConnector1">
@@ -9388,7 +9326,7 @@
         </p:nvCxnSpPr>
         <p:spPr>
           <a:xfrm flipH="1">
-            <a:off x="1439230" y="2727702"/>
+            <a:off x="1439230" y="1869744"/>
             <a:ext cx="612000" cy="0"/>
           </a:xfrm>
           <a:prstGeom prst="straightConnector1">
@@ -9430,7 +9368,7 @@
         </p:nvSpPr>
         <p:spPr>
           <a:xfrm>
-            <a:off x="559671" y="2915519"/>
+            <a:off x="559671" y="2057561"/>
             <a:ext cx="1570958" cy="369332"/>
           </a:xfrm>
           <a:prstGeom prst="rect">
@@ -9473,7 +9411,7 @@
         </p:nvSpPr>
         <p:spPr>
           <a:xfrm>
-            <a:off x="3331480" y="2966264"/>
+            <a:off x="3331480" y="2108306"/>
             <a:ext cx="1570958" cy="369332"/>
           </a:xfrm>
           <a:prstGeom prst="rect">
@@ -9502,10 +9440,844 @@
           </a:p>
         </p:txBody>
       </p:sp>
+      <p:graphicFrame>
+        <p:nvGraphicFramePr>
+          <p:cNvPr id="2" name="Table 1">
+            <a:extLst>
+              <a:ext uri="{FF2B5EF4-FFF2-40B4-BE49-F238E27FC236}">
+                <a16:creationId xmlns:a16="http://schemas.microsoft.com/office/drawing/2014/main" id="{67CAB262-387B-FB4C-A69F-414318E5A109}"/>
+              </a:ext>
+            </a:extLst>
+          </p:cNvPr>
+          <p:cNvGraphicFramePr>
+            <a:graphicFrameLocks noGrp="1"/>
+          </p:cNvGraphicFramePr>
+          <p:nvPr>
+            <p:extLst>
+              <p:ext uri="{D42A27DB-BD31-4B8C-83A1-F6EECF244321}">
+                <p14:modId xmlns:p14="http://schemas.microsoft.com/office/powerpoint/2010/main" val="1694879555"/>
+              </p:ext>
+            </p:extLst>
+          </p:nvPr>
+        </p:nvGraphicFramePr>
+        <p:xfrm>
+          <a:off x="6436128" y="3692416"/>
+          <a:ext cx="4152850" cy="2234252"/>
+        </p:xfrm>
+        <a:graphic>
+          <a:graphicData uri="http://schemas.openxmlformats.org/drawingml/2006/table">
+            <a:tbl>
+              <a:tblPr>
+                <a:tableStyleId>{F5AB1C69-6EDB-4FF4-983F-18BD219EF322}</a:tableStyleId>
+              </a:tblPr>
+              <a:tblGrid>
+                <a:gridCol w="2076425">
+                  <a:extLst>
+                    <a:ext uri="{9D8B030D-6E8A-4147-A177-3AD203B41FA5}">
+                      <a16:colId xmlns:a16="http://schemas.microsoft.com/office/drawing/2014/main" val="4224140641"/>
+                    </a:ext>
+                  </a:extLst>
+                </a:gridCol>
+                <a:gridCol w="2076425">
+                  <a:extLst>
+                    <a:ext uri="{9D8B030D-6E8A-4147-A177-3AD203B41FA5}">
+                      <a16:colId xmlns:a16="http://schemas.microsoft.com/office/drawing/2014/main" val="410414010"/>
+                    </a:ext>
+                  </a:extLst>
+                </a:gridCol>
+              </a:tblGrid>
+              <a:tr h="1117126">
+                <a:tc>
+                  <a:txBody>
+                    <a:bodyPr/>
+                    <a:lstStyle/>
+                    <a:p>
+                      <a:pPr algn="ctr"/>
+                      <a:r>
+                        <a:rPr lang="en-GR" sz="1600" dirty="0">
+                          <a:solidFill>
+                            <a:srgbClr val="FF0000"/>
+                          </a:solidFill>
+                          <a:latin typeface="+mj-lt"/>
+                        </a:rPr>
+                        <a:t> </a:t>
+                      </a:r>
+                    </a:p>
+                    <a:p>
+                      <a:pPr algn="ctr"/>
+                      <a:r>
+                        <a:rPr lang="en-GR" sz="1600" dirty="0">
+                          <a:solidFill>
+                            <a:srgbClr val="FF0000"/>
+                          </a:solidFill>
+                          <a:latin typeface="+mj-lt"/>
+                        </a:rPr>
+                        <a:t>Both jets TopTagged </a:t>
+                      </a:r>
+                      <a:r>
+                        <a:rPr lang="en-GR" sz="1600" dirty="0">
+                          <a:latin typeface="+mj-lt"/>
+                        </a:rPr>
+                        <a:t>+ </a:t>
+                      </a:r>
+                      <a:r>
+                        <a:rPr lang="en-GR" sz="1600" dirty="0">
+                          <a:solidFill>
+                            <a:srgbClr val="00B0F0"/>
+                          </a:solidFill>
+                          <a:latin typeface="+mj-lt"/>
+                        </a:rPr>
+                        <a:t>Both jets !B-tagged</a:t>
+                      </a:r>
+                    </a:p>
+                    <a:p>
+                      <a:pPr algn="ctr"/>
+                      <a:r>
+                        <a:rPr lang="en-GR" sz="1600" dirty="0">
+                          <a:solidFill>
+                            <a:schemeClr val="tx1"/>
+                          </a:solidFill>
+                          <a:latin typeface="+mj-lt"/>
+                        </a:rPr>
+                        <a:t>A</a:t>
+                      </a:r>
+                    </a:p>
+                  </a:txBody>
+                  <a:tcPr/>
+                </a:tc>
+                <a:tc>
+                  <a:txBody>
+                    <a:bodyPr/>
+                    <a:lstStyle/>
+                    <a:p>
+                      <a:pPr marL="0" marR="0" lvl="0" indent="0" algn="ctr" defTabSz="914400" rtl="0" eaLnBrk="1" fontAlgn="auto" latinLnBrk="0" hangingPunct="1">
+                        <a:lnSpc>
+                          <a:spcPct val="100000"/>
+                        </a:lnSpc>
+                        <a:spcBef>
+                          <a:spcPts val="0"/>
+                        </a:spcBef>
+                        <a:spcAft>
+                          <a:spcPts val="0"/>
+                        </a:spcAft>
+                        <a:buClrTx/>
+                        <a:buSzTx/>
+                        <a:buFontTx/>
+                        <a:buNone/>
+                        <a:tabLst/>
+                        <a:defRPr/>
+                      </a:pPr>
+                      <a:r>
+                        <a:rPr lang="en-GR" sz="1600" kern="1200" dirty="0">
+                          <a:solidFill>
+                            <a:srgbClr val="FF0000"/>
+                          </a:solidFill>
+                          <a:latin typeface="+mj-lt"/>
+                          <a:ea typeface="+mn-ea"/>
+                          <a:cs typeface="+mn-cs"/>
+                        </a:rPr>
+                        <a:t> Both jets TopTagged </a:t>
+                      </a:r>
+                      <a:r>
+                        <a:rPr lang="en-GR" sz="1600" kern="1200" dirty="0">
+                          <a:solidFill>
+                            <a:schemeClr val="dk1"/>
+                          </a:solidFill>
+                          <a:latin typeface="+mj-lt"/>
+                          <a:ea typeface="+mn-ea"/>
+                          <a:cs typeface="+mn-cs"/>
+                        </a:rPr>
+                        <a:t>+ </a:t>
+                      </a:r>
+                      <a:r>
+                        <a:rPr lang="en-GR" sz="1600" kern="1200" dirty="0">
+                          <a:solidFill>
+                            <a:srgbClr val="00B0F0"/>
+                          </a:solidFill>
+                          <a:latin typeface="+mj-lt"/>
+                          <a:ea typeface="+mn-ea"/>
+                          <a:cs typeface="+mn-cs"/>
+                        </a:rPr>
+                        <a:t>Both jets B-tagged</a:t>
+                      </a:r>
+                    </a:p>
+                    <a:p>
+                      <a:pPr marL="0" marR="0" lvl="0" indent="0" algn="ctr" defTabSz="914400" rtl="0" eaLnBrk="1" fontAlgn="auto" latinLnBrk="0" hangingPunct="1">
+                        <a:lnSpc>
+                          <a:spcPct val="100000"/>
+                        </a:lnSpc>
+                        <a:spcBef>
+                          <a:spcPts val="0"/>
+                        </a:spcBef>
+                        <a:spcAft>
+                          <a:spcPts val="0"/>
+                        </a:spcAft>
+                        <a:buClrTx/>
+                        <a:buSzTx/>
+                        <a:buFontTx/>
+                        <a:buNone/>
+                        <a:tabLst/>
+                        <a:defRPr/>
+                      </a:pPr>
+                      <a:r>
+                        <a:rPr lang="en-GR" sz="1600" kern="1200" dirty="0">
+                          <a:solidFill>
+                            <a:srgbClr val="00B050"/>
+                          </a:solidFill>
+                          <a:latin typeface="+mn-lt"/>
+                          <a:ea typeface="+mn-ea"/>
+                          <a:cs typeface="+mn-cs"/>
+                        </a:rPr>
+                        <a:t>(Signal Region)</a:t>
+                      </a:r>
+                    </a:p>
+                    <a:p>
+                      <a:pPr marL="0" marR="0" lvl="0" indent="0" algn="ctr" defTabSz="914400" rtl="0" eaLnBrk="1" fontAlgn="auto" latinLnBrk="0" hangingPunct="1">
+                        <a:lnSpc>
+                          <a:spcPct val="100000"/>
+                        </a:lnSpc>
+                        <a:spcBef>
+                          <a:spcPts val="0"/>
+                        </a:spcBef>
+                        <a:spcAft>
+                          <a:spcPts val="0"/>
+                        </a:spcAft>
+                        <a:buClrTx/>
+                        <a:buSzTx/>
+                        <a:buFontTx/>
+                        <a:buNone/>
+                        <a:tabLst/>
+                        <a:defRPr/>
+                      </a:pPr>
+                      <a:r>
+                        <a:rPr lang="en-GR" sz="1600" kern="1200" dirty="0">
+                          <a:solidFill>
+                            <a:schemeClr val="tx1"/>
+                          </a:solidFill>
+                          <a:latin typeface="+mn-lt"/>
+                          <a:ea typeface="+mn-ea"/>
+                          <a:cs typeface="+mn-cs"/>
+                        </a:rPr>
+                        <a:t>C</a:t>
+                      </a:r>
+                      <a:endParaRPr lang="en-GR" sz="1600" dirty="0">
+                        <a:solidFill>
+                          <a:schemeClr val="tx1"/>
+                        </a:solidFill>
+                        <a:latin typeface="+mj-lt"/>
+                      </a:endParaRPr>
+                    </a:p>
+                  </a:txBody>
+                  <a:tcPr/>
+                </a:tc>
+                <a:extLst>
+                  <a:ext uri="{0D108BD9-81ED-4DB2-BD59-A6C34878D82A}">
+                    <a16:rowId xmlns:a16="http://schemas.microsoft.com/office/drawing/2014/main" val="1861665646"/>
+                  </a:ext>
+                </a:extLst>
+              </a:tr>
+              <a:tr h="1117126">
+                <a:tc>
+                  <a:txBody>
+                    <a:bodyPr/>
+                    <a:lstStyle/>
+                    <a:p>
+                      <a:pPr marL="0" marR="0" lvl="0" indent="0" algn="ctr" defTabSz="914400" rtl="0" eaLnBrk="1" fontAlgn="auto" latinLnBrk="0" hangingPunct="1">
+                        <a:lnSpc>
+                          <a:spcPct val="100000"/>
+                        </a:lnSpc>
+                        <a:spcBef>
+                          <a:spcPts val="0"/>
+                        </a:spcBef>
+                        <a:spcAft>
+                          <a:spcPts val="0"/>
+                        </a:spcAft>
+                        <a:buClrTx/>
+                        <a:buSzTx/>
+                        <a:buFontTx/>
+                        <a:buNone/>
+                        <a:tabLst/>
+                        <a:defRPr/>
+                      </a:pPr>
+                      <a:endParaRPr lang="en-GR" sz="1600" kern="1200" dirty="0">
+                        <a:solidFill>
+                          <a:srgbClr val="FF0000"/>
+                        </a:solidFill>
+                        <a:latin typeface="+mj-lt"/>
+                        <a:ea typeface="+mn-ea"/>
+                        <a:cs typeface="+mn-cs"/>
+                      </a:endParaRPr>
+                    </a:p>
+                    <a:p>
+                      <a:pPr marL="0" marR="0" lvl="0" indent="0" algn="ctr" defTabSz="914400" rtl="0" eaLnBrk="1" fontAlgn="auto" latinLnBrk="0" hangingPunct="1">
+                        <a:lnSpc>
+                          <a:spcPct val="100000"/>
+                        </a:lnSpc>
+                        <a:spcBef>
+                          <a:spcPts val="0"/>
+                        </a:spcBef>
+                        <a:spcAft>
+                          <a:spcPts val="0"/>
+                        </a:spcAft>
+                        <a:buClrTx/>
+                        <a:buSzTx/>
+                        <a:buFontTx/>
+                        <a:buNone/>
+                        <a:tabLst/>
+                        <a:defRPr/>
+                      </a:pPr>
+                      <a:r>
+                        <a:rPr lang="en-GR" sz="1600" kern="1200" dirty="0">
+                          <a:solidFill>
+                            <a:srgbClr val="FF0000"/>
+                          </a:solidFill>
+                          <a:latin typeface="+mj-lt"/>
+                          <a:ea typeface="+mn-ea"/>
+                          <a:cs typeface="+mn-cs"/>
+                        </a:rPr>
+                        <a:t> Both jets !TopTagged </a:t>
+                      </a:r>
+                      <a:r>
+                        <a:rPr lang="en-GR" sz="1600" kern="1200" dirty="0">
+                          <a:solidFill>
+                            <a:schemeClr val="dk1"/>
+                          </a:solidFill>
+                          <a:latin typeface="+mj-lt"/>
+                          <a:ea typeface="+mn-ea"/>
+                          <a:cs typeface="+mn-cs"/>
+                        </a:rPr>
+                        <a:t>+ </a:t>
+                      </a:r>
+                      <a:r>
+                        <a:rPr lang="en-GR" sz="1600" kern="1200" dirty="0">
+                          <a:solidFill>
+                            <a:srgbClr val="00B0F0"/>
+                          </a:solidFill>
+                          <a:latin typeface="+mj-lt"/>
+                          <a:ea typeface="+mn-ea"/>
+                          <a:cs typeface="+mn-cs"/>
+                        </a:rPr>
+                        <a:t>Both jets !B-tagged</a:t>
+                      </a:r>
+                    </a:p>
+                    <a:p>
+                      <a:pPr marL="0" marR="0" lvl="0" indent="0" algn="ctr" defTabSz="914400" rtl="0" eaLnBrk="1" fontAlgn="auto" latinLnBrk="0" hangingPunct="1">
+                        <a:lnSpc>
+                          <a:spcPct val="100000"/>
+                        </a:lnSpc>
+                        <a:spcBef>
+                          <a:spcPts val="0"/>
+                        </a:spcBef>
+                        <a:spcAft>
+                          <a:spcPts val="0"/>
+                        </a:spcAft>
+                        <a:buClrTx/>
+                        <a:buSzTx/>
+                        <a:buFontTx/>
+                        <a:buNone/>
+                        <a:tabLst/>
+                        <a:defRPr/>
+                      </a:pPr>
+                      <a:r>
+                        <a:rPr lang="en-GR" sz="1600" kern="1200" dirty="0">
+                          <a:solidFill>
+                            <a:schemeClr val="tx1"/>
+                          </a:solidFill>
+                          <a:latin typeface="+mj-lt"/>
+                          <a:ea typeface="+mn-ea"/>
+                          <a:cs typeface="+mn-cs"/>
+                        </a:rPr>
+                        <a:t>B</a:t>
+                      </a:r>
+                      <a:endParaRPr lang="en-GR" sz="1600" dirty="0">
+                        <a:solidFill>
+                          <a:schemeClr val="tx1"/>
+                        </a:solidFill>
+                      </a:endParaRPr>
+                    </a:p>
+                  </a:txBody>
+                  <a:tcPr/>
+                </a:tc>
+                <a:tc>
+                  <a:txBody>
+                    <a:bodyPr/>
+                    <a:lstStyle/>
+                    <a:p>
+                      <a:pPr marL="0" marR="0" lvl="0" indent="0" algn="ctr" defTabSz="914400" rtl="0" eaLnBrk="1" fontAlgn="auto" latinLnBrk="0" hangingPunct="1">
+                        <a:lnSpc>
+                          <a:spcPct val="100000"/>
+                        </a:lnSpc>
+                        <a:spcBef>
+                          <a:spcPts val="0"/>
+                        </a:spcBef>
+                        <a:spcAft>
+                          <a:spcPts val="0"/>
+                        </a:spcAft>
+                        <a:buClrTx/>
+                        <a:buSzTx/>
+                        <a:buFontTx/>
+                        <a:buNone/>
+                        <a:tabLst/>
+                        <a:defRPr/>
+                      </a:pPr>
+                      <a:endParaRPr lang="en-GR" sz="1600" kern="1200" dirty="0">
+                        <a:solidFill>
+                          <a:srgbClr val="FF0000"/>
+                        </a:solidFill>
+                        <a:latin typeface="+mn-lt"/>
+                        <a:ea typeface="+mn-ea"/>
+                        <a:cs typeface="+mn-cs"/>
+                      </a:endParaRPr>
+                    </a:p>
+                    <a:p>
+                      <a:pPr marL="0" marR="0" lvl="0" indent="0" algn="ctr" defTabSz="914400" rtl="0" eaLnBrk="1" fontAlgn="auto" latinLnBrk="0" hangingPunct="1">
+                        <a:lnSpc>
+                          <a:spcPct val="100000"/>
+                        </a:lnSpc>
+                        <a:spcBef>
+                          <a:spcPts val="0"/>
+                        </a:spcBef>
+                        <a:spcAft>
+                          <a:spcPts val="0"/>
+                        </a:spcAft>
+                        <a:buClrTx/>
+                        <a:buSzTx/>
+                        <a:buFontTx/>
+                        <a:buNone/>
+                        <a:tabLst/>
+                        <a:defRPr/>
+                      </a:pPr>
+                      <a:r>
+                        <a:rPr lang="en-GR" sz="1600" kern="1200" dirty="0">
+                          <a:solidFill>
+                            <a:srgbClr val="FF0000"/>
+                          </a:solidFill>
+                          <a:latin typeface="+mn-lt"/>
+                          <a:ea typeface="+mn-ea"/>
+                          <a:cs typeface="+mn-cs"/>
+                        </a:rPr>
+                        <a:t> </a:t>
+                      </a:r>
+                      <a:r>
+                        <a:rPr lang="en-GR" sz="1600" kern="1200" dirty="0">
+                          <a:solidFill>
+                            <a:srgbClr val="FF0000"/>
+                          </a:solidFill>
+                          <a:latin typeface="+mj-lt"/>
+                          <a:ea typeface="+mn-ea"/>
+                          <a:cs typeface="+mn-cs"/>
+                        </a:rPr>
+                        <a:t>Both jets !TopTagged </a:t>
+                      </a:r>
+                      <a:r>
+                        <a:rPr lang="en-GR" sz="1600" kern="1200" dirty="0">
+                          <a:solidFill>
+                            <a:srgbClr val="00B0F0"/>
+                          </a:solidFill>
+                          <a:latin typeface="+mj-lt"/>
+                          <a:ea typeface="+mn-ea"/>
+                          <a:cs typeface="+mn-cs"/>
+                        </a:rPr>
+                        <a:t>+ Both jets B-tagged</a:t>
+                      </a:r>
+                    </a:p>
+                    <a:p>
+                      <a:pPr marL="0" marR="0" lvl="0" indent="0" algn="ctr" defTabSz="914400" rtl="0" eaLnBrk="1" fontAlgn="auto" latinLnBrk="0" hangingPunct="1">
+                        <a:lnSpc>
+                          <a:spcPct val="100000"/>
+                        </a:lnSpc>
+                        <a:spcBef>
+                          <a:spcPts val="0"/>
+                        </a:spcBef>
+                        <a:spcAft>
+                          <a:spcPts val="0"/>
+                        </a:spcAft>
+                        <a:buClrTx/>
+                        <a:buSzTx/>
+                        <a:buFontTx/>
+                        <a:buNone/>
+                        <a:tabLst/>
+                        <a:defRPr/>
+                      </a:pPr>
+                      <a:r>
+                        <a:rPr lang="en-GR" sz="1600" kern="1200" dirty="0">
+                          <a:solidFill>
+                            <a:schemeClr val="tx1"/>
+                          </a:solidFill>
+                          <a:latin typeface="+mj-lt"/>
+                          <a:ea typeface="+mn-ea"/>
+                          <a:cs typeface="+mn-cs"/>
+                        </a:rPr>
+                        <a:t>D</a:t>
+                      </a:r>
+                      <a:endParaRPr lang="en-GR" sz="1600" dirty="0">
+                        <a:solidFill>
+                          <a:schemeClr val="tx1"/>
+                        </a:solidFill>
+                        <a:latin typeface="+mj-lt"/>
+                      </a:endParaRPr>
+                    </a:p>
+                  </a:txBody>
+                  <a:tcPr/>
+                </a:tc>
+                <a:extLst>
+                  <a:ext uri="{0D108BD9-81ED-4DB2-BD59-A6C34878D82A}">
+                    <a16:rowId xmlns:a16="http://schemas.microsoft.com/office/drawing/2014/main" val="502448082"/>
+                  </a:ext>
+                </a:extLst>
+              </a:tr>
+            </a:tbl>
+          </a:graphicData>
+        </a:graphic>
+      </p:graphicFrame>
+      <p:sp>
+        <p:nvSpPr>
+          <p:cNvPr id="4" name="TextBox 3">
+            <a:extLst>
+              <a:ext uri="{FF2B5EF4-FFF2-40B4-BE49-F238E27FC236}">
+                <a16:creationId xmlns:a16="http://schemas.microsoft.com/office/drawing/2014/main" id="{5834A548-00BB-294E-ABB0-996A878E610D}"/>
+              </a:ext>
+            </a:extLst>
+          </p:cNvPr>
+          <p:cNvSpPr txBox="1"/>
+          <p:nvPr/>
+        </p:nvSpPr>
+        <p:spPr>
+          <a:xfrm rot="16200000">
+            <a:off x="5142396" y="4617631"/>
+            <a:ext cx="1467556" cy="383822"/>
+          </a:xfrm>
+          <a:prstGeom prst="rect">
+            <a:avLst/>
+          </a:prstGeom>
+          <a:noFill/>
+        </p:spPr>
+        <p:txBody>
+          <a:bodyPr wrap="square" rtlCol="0">
+            <a:spAutoFit/>
+          </a:bodyPr>
+          <a:lstStyle/>
+          <a:p>
+            <a:pPr algn="ctr"/>
+            <a:r>
+              <a:rPr lang="en-GR" dirty="0">
+                <a:solidFill>
+                  <a:srgbClr val="FF0000"/>
+                </a:solidFill>
+              </a:rPr>
+              <a:t>Top tagged</a:t>
+            </a:r>
+          </a:p>
+        </p:txBody>
+      </p:sp>
+      <p:sp>
+        <p:nvSpPr>
+          <p:cNvPr id="16" name="TextBox 15">
+            <a:extLst>
+              <a:ext uri="{FF2B5EF4-FFF2-40B4-BE49-F238E27FC236}">
+                <a16:creationId xmlns:a16="http://schemas.microsoft.com/office/drawing/2014/main" id="{E65D1E6F-16D9-744C-931C-F93617B03CA2}"/>
+              </a:ext>
+            </a:extLst>
+          </p:cNvPr>
+          <p:cNvSpPr txBox="1"/>
+          <p:nvPr/>
+        </p:nvSpPr>
+        <p:spPr>
+          <a:xfrm>
+            <a:off x="7775211" y="5926668"/>
+            <a:ext cx="1467556" cy="383822"/>
+          </a:xfrm>
+          <a:prstGeom prst="rect">
+            <a:avLst/>
+          </a:prstGeom>
+          <a:noFill/>
+        </p:spPr>
+        <p:txBody>
+          <a:bodyPr wrap="square" rtlCol="0">
+            <a:spAutoFit/>
+          </a:bodyPr>
+          <a:lstStyle/>
+          <a:p>
+            <a:pPr algn="ctr"/>
+            <a:r>
+              <a:rPr lang="en-GR" dirty="0">
+                <a:solidFill>
+                  <a:srgbClr val="00B0F0"/>
+                </a:solidFill>
+              </a:rPr>
+              <a:t>B tagged</a:t>
+            </a:r>
+          </a:p>
+        </p:txBody>
+      </p:sp>
+      <mc:AlternateContent xmlns:mc="http://schemas.openxmlformats.org/markup-compatibility/2006">
+        <mc:Choice xmlns:a14="http://schemas.microsoft.com/office/drawing/2010/main" Requires="a14">
+          <p:sp>
+            <p:nvSpPr>
+              <p:cNvPr id="9" name="TextBox 8">
+                <a:extLst>
+                  <a:ext uri="{FF2B5EF4-FFF2-40B4-BE49-F238E27FC236}">
+                    <a16:creationId xmlns:a16="http://schemas.microsoft.com/office/drawing/2014/main" id="{77E7030B-E635-4F4D-9801-4366EB74D9A8}"/>
+                  </a:ext>
+                </a:extLst>
+              </p:cNvPr>
+              <p:cNvSpPr txBox="1"/>
+              <p:nvPr/>
+            </p:nvSpPr>
+            <p:spPr>
+              <a:xfrm>
+                <a:off x="4116959" y="5148259"/>
+                <a:ext cx="948266" cy="485582"/>
+              </a:xfrm>
+              <a:prstGeom prst="rect">
+                <a:avLst/>
+              </a:prstGeom>
+              <a:noFill/>
+            </p:spPr>
+            <p:txBody>
+              <a:bodyPr wrap="square" rtlCol="0">
+                <a:spAutoFit/>
+              </a:bodyPr>
+              <a:lstStyle/>
+              <a:p>
+                <a:r>
+                  <a:rPr lang="en-GR" dirty="0"/>
+                  <a:t>C = </a:t>
+                </a:r>
+                <a14:m>
+                  <m:oMath xmlns:m="http://schemas.openxmlformats.org/officeDocument/2006/math">
+                    <m:f>
+                      <m:fPr>
+                        <m:ctrlPr>
+                          <a:rPr lang="en-US" b="0" i="1" smtClean="0">
+                            <a:latin typeface="Cambria Math" panose="02040503050406030204" pitchFamily="18" charset="0"/>
+                          </a:rPr>
+                        </m:ctrlPr>
+                      </m:fPr>
+                      <m:num>
+                        <m:r>
+                          <a:rPr lang="en-US" b="0" i="1" smtClean="0">
+                            <a:latin typeface="Cambria Math" panose="02040503050406030204" pitchFamily="18" charset="0"/>
+                          </a:rPr>
+                          <m:t>𝐴</m:t>
+                        </m:r>
+                      </m:num>
+                      <m:den>
+                        <m:r>
+                          <a:rPr lang="en-US" b="0" i="1" smtClean="0">
+                            <a:latin typeface="Cambria Math" panose="02040503050406030204" pitchFamily="18" charset="0"/>
+                          </a:rPr>
+                          <m:t>𝐵</m:t>
+                        </m:r>
+                      </m:den>
+                    </m:f>
+                    <m:r>
+                      <a:rPr lang="en-US" b="0" i="1" smtClean="0">
+                        <a:latin typeface="Cambria Math" panose="02040503050406030204" pitchFamily="18" charset="0"/>
+                      </a:rPr>
+                      <m:t>𝐷</m:t>
+                    </m:r>
+                  </m:oMath>
+                </a14:m>
+                <a:endParaRPr lang="en-GR" dirty="0"/>
+              </a:p>
+            </p:txBody>
+          </p:sp>
+        </mc:Choice>
+        <mc:Fallback>
+          <p:sp>
+            <p:nvSpPr>
+              <p:cNvPr id="9" name="TextBox 8">
+                <a:extLst>
+                  <a:ext uri="{FF2B5EF4-FFF2-40B4-BE49-F238E27FC236}">
+                    <a16:creationId xmlns:a16="http://schemas.microsoft.com/office/drawing/2014/main" id="{77E7030B-E635-4F4D-9801-4366EB74D9A8}"/>
+                  </a:ext>
+                </a:extLst>
+              </p:cNvPr>
+              <p:cNvSpPr txBox="1">
+                <a:spLocks noRot="1" noChangeAspect="1" noMove="1" noResize="1" noEditPoints="1" noAdjustHandles="1" noChangeArrowheads="1" noChangeShapeType="1" noTextEdit="1"/>
+              </p:cNvSpPr>
+              <p:nvPr/>
+            </p:nvSpPr>
+            <p:spPr>
+              <a:xfrm>
+                <a:off x="4116959" y="5148259"/>
+                <a:ext cx="948266" cy="485582"/>
+              </a:xfrm>
+              <a:prstGeom prst="rect">
+                <a:avLst/>
+              </a:prstGeom>
+              <a:blipFill>
+                <a:blip r:embed="rId3"/>
+                <a:stretch>
+                  <a:fillRect l="-5333" b="-7500"/>
+                </a:stretch>
+              </a:blipFill>
+            </p:spPr>
+            <p:txBody>
+              <a:bodyPr/>
+              <a:lstStyle/>
+              <a:p>
+                <a:r>
+                  <a:rPr lang="en-GR">
+                    <a:noFill/>
+                  </a:rPr>
+                  <a:t> </a:t>
+                </a:r>
+              </a:p>
+            </p:txBody>
+          </p:sp>
+        </mc:Fallback>
+      </mc:AlternateContent>
     </p:spTree>
     <p:extLst>
       <p:ext uri="{BB962C8B-B14F-4D97-AF65-F5344CB8AC3E}">
         <p14:creationId xmlns:p14="http://schemas.microsoft.com/office/powerpoint/2010/main" val="2635234002"/>
+      </p:ext>
+    </p:extLst>
+  </p:cSld>
+  <p:clrMapOvr>
+    <a:masterClrMapping/>
+  </p:clrMapOvr>
+</p:sld>
+</file>
+
+<file path=ppt/slides/slide4.xml><?xml version="1.0" encoding="utf-8"?>
+<p:sld xmlns:a="http://schemas.openxmlformats.org/drawingml/2006/main" xmlns:r="http://schemas.openxmlformats.org/officeDocument/2006/relationships" xmlns:p="http://schemas.openxmlformats.org/presentationml/2006/main">
+  <p:cSld>
+    <p:spTree>
+      <p:nvGrpSpPr>
+        <p:cNvPr id="1" name=""/>
+        <p:cNvGrpSpPr/>
+        <p:nvPr/>
+      </p:nvGrpSpPr>
+      <p:grpSpPr>
+        <a:xfrm>
+          <a:off x="0" y="0"/>
+          <a:ext cx="0" cy="0"/>
+          <a:chOff x="0" y="0"/>
+          <a:chExt cx="0" cy="0"/>
+        </a:xfrm>
+      </p:grpSpPr>
+      <p:sp>
+        <p:nvSpPr>
+          <p:cNvPr id="3" name="Footer Placeholder 2"/>
+          <p:cNvSpPr>
+            <a:spLocks noGrp="1"/>
+          </p:cNvSpPr>
+          <p:nvPr>
+            <p:ph type="ftr" sz="quarter" idx="11"/>
+          </p:nvPr>
+        </p:nvSpPr>
+        <p:spPr/>
+        <p:txBody>
+          <a:bodyPr/>
+          <a:lstStyle/>
+          <a:p>
+            <a:r>
+              <a:rPr lang="fi-FI" dirty="0"/>
+              <a:t>NTUA G. </a:t>
+            </a:r>
+            <a:r>
+              <a:rPr lang="fi-FI" dirty="0" err="1"/>
+              <a:t>Bakas</a:t>
+            </a:r>
+            <a:endParaRPr lang="en-US" dirty="0"/>
+          </a:p>
+        </p:txBody>
+      </p:sp>
+      <p:sp>
+        <p:nvSpPr>
+          <p:cNvPr id="7" name="TextBox 6"/>
+          <p:cNvSpPr txBox="1"/>
+          <p:nvPr/>
+        </p:nvSpPr>
+        <p:spPr>
+          <a:xfrm>
+            <a:off x="111965" y="83975"/>
+            <a:ext cx="11783049" cy="523220"/>
+          </a:xfrm>
+          <a:prstGeom prst="rect">
+            <a:avLst/>
+          </a:prstGeom>
+          <a:noFill/>
+        </p:spPr>
+        <p:txBody>
+          <a:bodyPr wrap="square" rtlCol="0">
+            <a:spAutoFit/>
+          </a:bodyPr>
+          <a:lstStyle/>
+          <a:p>
+            <a:r>
+              <a:rPr lang="en-US" sz="2800" u="sng" dirty="0"/>
+              <a:t>Unfolding</a:t>
+            </a:r>
+          </a:p>
+        </p:txBody>
+      </p:sp>
+      <p:sp>
+        <p:nvSpPr>
+          <p:cNvPr id="5" name="Slide Number Placeholder 4">
+            <a:extLst>
+              <a:ext uri="{FF2B5EF4-FFF2-40B4-BE49-F238E27FC236}">
+                <a16:creationId xmlns:a16="http://schemas.microsoft.com/office/drawing/2014/main" id="{69A96869-DB60-5345-ACD9-F1C41035B064}"/>
+              </a:ext>
+            </a:extLst>
+          </p:cNvPr>
+          <p:cNvSpPr>
+            <a:spLocks noGrp="1"/>
+          </p:cNvSpPr>
+          <p:nvPr>
+            <p:ph type="sldNum" sz="quarter" idx="12"/>
+          </p:nvPr>
+        </p:nvSpPr>
+        <p:spPr/>
+        <p:txBody>
+          <a:bodyPr/>
+          <a:lstStyle/>
+          <a:p>
+            <a:fld id="{4FAB73BC-B049-4115-A692-8D63A059BFB8}" type="slidenum">
+              <a:rPr lang="en-US" smtClean="0"/>
+              <a:pPr/>
+              <a:t>4</a:t>
+            </a:fld>
+            <a:endParaRPr lang="en-US" dirty="0"/>
+          </a:p>
+        </p:txBody>
+      </p:sp>
+      <p:sp>
+        <p:nvSpPr>
+          <p:cNvPr id="24" name="Date Placeholder 23">
+            <a:extLst>
+              <a:ext uri="{FF2B5EF4-FFF2-40B4-BE49-F238E27FC236}">
+                <a16:creationId xmlns:a16="http://schemas.microsoft.com/office/drawing/2014/main" id="{056D71EF-2E89-4043-8F92-90A4D46A3E69}"/>
+              </a:ext>
+            </a:extLst>
+          </p:cNvPr>
+          <p:cNvSpPr>
+            <a:spLocks noGrp="1"/>
+          </p:cNvSpPr>
+          <p:nvPr>
+            <p:ph type="dt" sz="half" idx="10"/>
+          </p:nvPr>
+        </p:nvSpPr>
+        <p:spPr/>
+        <p:txBody>
+          <a:bodyPr/>
+          <a:lstStyle/>
+          <a:p>
+            <a:fld id="{A495A033-A54B-4F41-92C4-F7053274BB0C}" type="datetime1">
+              <a:rPr lang="en-US" smtClean="0"/>
+              <a:t>3/27/20</a:t>
+            </a:fld>
+            <a:endParaRPr lang="en-US" dirty="0"/>
+          </a:p>
+        </p:txBody>
+      </p:sp>
+    </p:spTree>
+    <p:extLst>
+      <p:ext uri="{BB962C8B-B14F-4D97-AF65-F5344CB8AC3E}">
+        <p14:creationId xmlns:p14="http://schemas.microsoft.com/office/powerpoint/2010/main" val="654380553"/>
       </p:ext>
     </p:extLst>
   </p:cSld>

</xml_diff>